<commit_message>
Fixed sac pusher reward model path
</commit_message>
<xml_diff>
--- a/Poster.pptx
+++ b/Poster.pptx
@@ -2401,7 +2401,7 @@
         <p:spPr bwMode="auto">
           <a:xfrm>
             <a:off x="1524000" y="1935163"/>
-            <a:ext cx="8007350" cy="1189037"/>
+            <a:ext cx="10238700" cy="1200329"/>
           </a:xfrm>
           <a:prstGeom prst="rect">
             <a:avLst/>
@@ -2423,13 +2423,13 @@
           <a:p>
             <a:pPr algn="l"/>
             <a:r>
-              <a:rPr lang="en-US" sz="7200" b="1">
+              <a:rPr lang="en-US" sz="7200" b="1" dirty="0">
                 <a:solidFill>
                   <a:srgbClr val="FFFFFF"/>
                 </a:solidFill>
                 <a:latin typeface="Arial" charset="0"/>
               </a:rPr>
-              <a:t>Department Name</a:t>
+              <a:t>College of Engineering</a:t>
             </a:r>
           </a:p>
         </p:txBody>
@@ -2445,7 +2445,7 @@
         <p:spPr bwMode="auto">
           <a:xfrm>
             <a:off x="23241000" y="1660525"/>
-            <a:ext cx="19202400" cy="1311275"/>
+            <a:ext cx="19202400" cy="1324786"/>
           </a:xfrm>
           <a:prstGeom prst="rect">
             <a:avLst/>
@@ -2474,13 +2474,13 @@
               </a:spcBef>
             </a:pPr>
             <a:r>
-              <a:rPr lang="en-US" sz="4000">
+              <a:rPr lang="en-US" sz="4000" dirty="0">
                 <a:solidFill>
                   <a:schemeClr val="bg1"/>
                 </a:solidFill>
                 <a:latin typeface="Arial" charset="0"/>
               </a:rPr>
-              <a:t>Association or meeting title</a:t>
+              <a:t>Spring 2025 Honors Poster Presentation</a:t>
             </a:r>
           </a:p>
           <a:p>
@@ -2493,7 +2493,7 @@
               </a:spcBef>
             </a:pPr>
             <a:r>
-              <a:rPr lang="en-US" sz="4000">
+              <a:rPr lang="en-US" sz="4000" dirty="0">
                 <a:solidFill>
                   <a:schemeClr val="bg1"/>
                 </a:solidFill>
@@ -2547,7 +2547,7 @@
                 </a:solidFill>
                 <a:latin typeface="Arial" charset="0"/>
               </a:rPr>
-              <a:t>Principal investigators</a:t>
+              <a:t>Nathan Van Utrecht</a:t>
             </a:r>
           </a:p>
         </p:txBody>
@@ -2620,7 +2620,7 @@
         <p:spPr bwMode="auto">
           <a:xfrm>
             <a:off x="1597025" y="5692775"/>
-            <a:ext cx="5718175" cy="1311275"/>
+            <a:ext cx="9193542" cy="1323439"/>
           </a:xfrm>
           <a:prstGeom prst="rect">
             <a:avLst/>
@@ -2642,10 +2642,10 @@
           <a:p>
             <a:pPr algn="l"/>
             <a:r>
-              <a:rPr lang="en-US" sz="8000" b="1">
+              <a:rPr lang="en-US" sz="8000" b="1" dirty="0">
                 <a:latin typeface="Arial" charset="0"/>
               </a:rPr>
-              <a:t>Poster Title</a:t>
+              <a:t>Learning the Goal </a:t>
             </a:r>
           </a:p>
         </p:txBody>

</xml_diff>

<commit_message>
Started working on finishing the other evaluation experiments
</commit_message>
<xml_diff>
--- a/Poster.pptx
+++ b/Poster.pptx
@@ -2401,7 +2401,7 @@
         <p:spPr bwMode="auto">
           <a:xfrm>
             <a:off x="1524000" y="1935163"/>
-            <a:ext cx="10238700" cy="1200329"/>
+            <a:ext cx="17266265" cy="1200329"/>
           </a:xfrm>
           <a:prstGeom prst="rect">
             <a:avLst/>
@@ -2429,7 +2429,7 @@
                 </a:solidFill>
                 <a:latin typeface="Arial" charset="0"/>
               </a:rPr>
-              <a:t>College of Engineering</a:t>
+              <a:t>Department of Mechanical Engineering</a:t>
             </a:r>
           </a:p>
         </p:txBody>
@@ -2619,8 +2619,8 @@
         </p:nvSpPr>
         <p:spPr bwMode="auto">
           <a:xfrm>
-            <a:off x="1597025" y="5692775"/>
-            <a:ext cx="9193542" cy="1323439"/>
+            <a:off x="767430" y="5594248"/>
+            <a:ext cx="42356339" cy="1015663"/>
           </a:xfrm>
           <a:prstGeom prst="rect">
             <a:avLst/>
@@ -2642,53 +2642,10 @@
           <a:p>
             <a:pPr algn="l"/>
             <a:r>
-              <a:rPr lang="en-US" sz="8000" b="1" dirty="0">
+              <a:rPr lang="en-US" sz="6000" b="1" dirty="0">
                 <a:latin typeface="Arial" charset="0"/>
               </a:rPr>
-              <a:t>Learning the Goal </a:t>
-            </a:r>
-          </a:p>
-        </p:txBody>
-      </p:sp>
-      <p:sp>
-        <p:nvSpPr>
-          <p:cNvPr id="2066" name="Text Box 18"/>
-          <p:cNvSpPr txBox="1">
-            <a:spLocks noChangeArrowheads="1"/>
-          </p:cNvSpPr>
-          <p:nvPr/>
-        </p:nvSpPr>
-        <p:spPr bwMode="auto">
-          <a:xfrm>
-            <a:off x="1752600" y="8001000"/>
-            <a:ext cx="8229600" cy="701675"/>
-          </a:xfrm>
-          <a:prstGeom prst="rect">
-            <a:avLst/>
-          </a:prstGeom>
-          <a:noFill/>
-          <a:ln w="9525">
-            <a:noFill/>
-            <a:miter lim="800000"/>
-            <a:headEnd/>
-            <a:tailEnd/>
-          </a:ln>
-          <a:effectLst/>
-        </p:spPr>
-        <p:txBody>
-          <a:bodyPr>
-            <a:spAutoFit/>
-          </a:bodyPr>
-          <a:lstStyle/>
-          <a:p>
-            <a:pPr algn="l">
-              <a:spcBef>
-                <a:spcPct val="50000"/>
-              </a:spcBef>
-            </a:pPr>
-            <a:r>
-              <a:rPr lang="en-US" sz="4000" dirty="0"/>
-              <a:t>Content</a:t>
+              <a:t>From Demonstrations to Adaptation: Assessing Imitation Learning Robustness and Learned Reward Transferability</a:t>
             </a:r>
           </a:p>
         </p:txBody>

</xml_diff>